<commit_message>
Fine tuning for slides 3-3, 3-4, 3-6
</commit_message>
<xml_diff>
--- a/slides/Tag-3_3-Container-Registry_Light.pptx
+++ b/slides/Tag-3_3-Container-Registry_Light.pptx
@@ -1305,7 +1305,7 @@
             <a:fld id="{18182567-388C-4D33-8B7B-A651F195F118}" type="slidenum">
               <a:rPr lang="de-DE" altLang="de-DE" smtClean="0"/>
               <a:pPr/>
-              <a:t>29</a:t>
+              <a:t>25</a:t>
             </a:fld>
             <a:endParaRPr lang="de-DE" altLang="de-DE"/>
           </a:p>
@@ -1314,7 +1314,7 @@
     </p:spTree>
     <p:extLst>
       <p:ext uri="{BB962C8B-B14F-4D97-AF65-F5344CB8AC3E}">
-        <p14:creationId xmlns:p14="http://schemas.microsoft.com/office/powerpoint/2010/main" val="3056766989"/>
+        <p14:creationId xmlns:p14="http://schemas.microsoft.com/office/powerpoint/2010/main" val="3690600403"/>
       </p:ext>
     </p:extLst>
   </p:cSld>
@@ -1368,6 +1368,91 @@
           <a:bodyPr/>
           <a:lstStyle/>
           <a:p>
+            <a:endParaRPr lang="de-DE" dirty="0"/>
+          </a:p>
+        </p:txBody>
+      </p:sp>
+      <p:sp>
+        <p:nvSpPr>
+          <p:cNvPr id="4" name="Foliennummernplatzhalter 3"/>
+          <p:cNvSpPr>
+            <a:spLocks noGrp="1"/>
+          </p:cNvSpPr>
+          <p:nvPr>
+            <p:ph type="sldNum" sz="quarter" idx="5"/>
+          </p:nvPr>
+        </p:nvSpPr>
+        <p:spPr/>
+        <p:txBody>
+          <a:bodyPr/>
+          <a:lstStyle/>
+          <a:p>
+            <a:fld id="{18182567-388C-4D33-8B7B-A651F195F118}" type="slidenum">
+              <a:rPr lang="de-DE" altLang="de-DE" smtClean="0"/>
+              <a:pPr/>
+              <a:t>29</a:t>
+            </a:fld>
+            <a:endParaRPr lang="de-DE" altLang="de-DE"/>
+          </a:p>
+        </p:txBody>
+      </p:sp>
+    </p:spTree>
+    <p:extLst>
+      <p:ext uri="{BB962C8B-B14F-4D97-AF65-F5344CB8AC3E}">
+        <p14:creationId xmlns:p14="http://schemas.microsoft.com/office/powerpoint/2010/main" val="3056766989"/>
+      </p:ext>
+    </p:extLst>
+  </p:cSld>
+  <p:clrMapOvr>
+    <a:masterClrMapping/>
+  </p:clrMapOvr>
+</p:notes>
+</file>
+
+<file path=ppt/notesSlides/notesSlide14.xml><?xml version="1.0" encoding="utf-8"?>
+<p:notes xmlns:a="http://schemas.openxmlformats.org/drawingml/2006/main" xmlns:r="http://schemas.openxmlformats.org/officeDocument/2006/relationships" xmlns:p="http://schemas.openxmlformats.org/presentationml/2006/main">
+  <p:cSld>
+    <p:spTree>
+      <p:nvGrpSpPr>
+        <p:cNvPr id="1" name=""/>
+        <p:cNvGrpSpPr/>
+        <p:nvPr/>
+      </p:nvGrpSpPr>
+      <p:grpSpPr>
+        <a:xfrm>
+          <a:off x="0" y="0"/>
+          <a:ext cx="0" cy="0"/>
+          <a:chOff x="0" y="0"/>
+          <a:chExt cx="0" cy="0"/>
+        </a:xfrm>
+      </p:grpSpPr>
+      <p:sp>
+        <p:nvSpPr>
+          <p:cNvPr id="2" name="Folienbildplatzhalter 1"/>
+          <p:cNvSpPr>
+            <a:spLocks noGrp="1" noRot="1" noChangeAspect="1"/>
+          </p:cNvSpPr>
+          <p:nvPr>
+            <p:ph type="sldImg"/>
+          </p:nvPr>
+        </p:nvSpPr>
+        <p:spPr/>
+      </p:sp>
+      <p:sp>
+        <p:nvSpPr>
+          <p:cNvPr id="3" name="Notizenplatzhalter 2"/>
+          <p:cNvSpPr>
+            <a:spLocks noGrp="1"/>
+          </p:cNvSpPr>
+          <p:nvPr>
+            <p:ph type="body" idx="1"/>
+          </p:nvPr>
+        </p:nvSpPr>
+        <p:spPr/>
+        <p:txBody>
+          <a:bodyPr/>
+          <a:lstStyle/>
+          <a:p>
             <a:r>
               <a:rPr lang="de-DE" dirty="0"/>
               <a:t>https://docs.gitlab.com/ee/user/packages/container_registry/</a:t>
@@ -1379,7 +1464,7 @@
           <a:p>
             <a:r>
               <a:rPr lang="de-DE" dirty="0"/>
-              <a:t>Docker V2: https://distribution.github.io/distribution/spec/manifest-v2-2/</a:t>
+              <a:t>Docker v2: https://distribution.github.io/distribution/spec/manifest-v2-2/</a:t>
             </a:r>
           </a:p>
           <a:p>
@@ -2636,7 +2721,7 @@
               <a:pPr algn="ctr">
                 <a:defRPr/>
               </a:pPr>
-              <a:t>11.06.2024</a:t>
+              <a:t>12.06.2024</a:t>
             </a:fld>
             <a:endParaRPr lang="de-DE" sz="1000">
               <a:solidFill>
@@ -3020,7 +3105,7 @@
         </p:nvSpPr>
         <p:spPr bwMode="auto">
           <a:xfrm>
-            <a:off x="4252913" y="6424613"/>
+            <a:off x="3900200" y="6451600"/>
             <a:ext cx="2121093" cy="246221"/>
           </a:xfrm>
           <a:prstGeom prst="rect">
@@ -5093,7 +5178,7 @@
             </a:pPr>
             <a:r>
               <a:rPr lang="de-DE" dirty="0"/>
-              <a:t>Tags eines bestimmten Container Image ansehen</a:t>
+              <a:t>Tags eines bestimmten Container Images ansehen</a:t>
             </a:r>
           </a:p>
           <a:p>
@@ -5676,7 +5761,7 @@
             </a:pPr>
             <a:r>
               <a:rPr lang="de-DE" dirty="0"/>
-              <a:t>Nur Members des Projekts und der Gruppe haben Zugriff</a:t>
+              <a:t>Nur Members des Projektes und der Gruppe haben Zugriff</a:t>
             </a:r>
           </a:p>
           <a:p>
@@ -5985,7 +6070,7 @@
             </a:pPr>
             <a:r>
               <a:rPr lang="de-DE" dirty="0"/>
-              <a:t>Siehe Vorschlagstext von </a:t>
+              <a:t>Siehe vorangegangene Hinweise von </a:t>
             </a:r>
             <a:r>
               <a:rPr lang="de-DE" dirty="0" err="1"/>
@@ -7447,6 +7532,15 @@
             </a:r>
           </a:p>
           <a:p>
+            <a:pPr lvl="1">
+              <a:buFont typeface="Arial" panose="020B0604020202020204" pitchFamily="34" charset="0"/>
+              <a:buChar char="•"/>
+            </a:pPr>
+            <a:endParaRPr lang="de-DE" dirty="0">
+              <a:sym typeface="Wingdings" panose="05000000000000000000" pitchFamily="2" charset="2"/>
+            </a:endParaRPr>
+          </a:p>
+          <a:p>
             <a:pPr>
               <a:buFont typeface="Arial" panose="020B0604020202020204" pitchFamily="34" charset="0"/>
               <a:buChar char="•"/>
@@ -7461,7 +7555,7 @@
               <a:rPr lang="de-DE" dirty="0" err="1">
                 <a:sym typeface="Wingdings" panose="05000000000000000000" pitchFamily="2" charset="2"/>
               </a:rPr>
-              <a:t>practise</a:t>
+              <a:t>practice</a:t>
             </a:r>
             <a:endParaRPr lang="de-DE" dirty="0">
               <a:sym typeface="Wingdings" panose="05000000000000000000" pitchFamily="2" charset="2"/>
@@ -7476,46 +7570,40 @@
               <a:rPr lang="de-DE" dirty="0">
                 <a:sym typeface="Wingdings" panose="05000000000000000000" pitchFamily="2" charset="2"/>
               </a:rPr>
-              <a:t>:</a:t>
+              <a:t>Keine Version  z.B. </a:t>
             </a:r>
             <a:r>
               <a:rPr lang="de-DE" dirty="0" err="1">
                 <a:sym typeface="Wingdings" panose="05000000000000000000" pitchFamily="2" charset="2"/>
               </a:rPr>
-              <a:t>latest</a:t>
+              <a:t>docker</a:t>
             </a:r>
             <a:endParaRPr lang="de-DE" dirty="0">
               <a:sym typeface="Wingdings" panose="05000000000000000000" pitchFamily="2" charset="2"/>
             </a:endParaRPr>
           </a:p>
           <a:p>
-            <a:pPr lvl="2">
-              <a:buFont typeface="Arial" panose="020B0604020202020204" pitchFamily="34" charset="0"/>
-              <a:buChar char="•"/>
-            </a:pPr>
-            <a:r>
-              <a:rPr lang="de-DE" sz="1800" dirty="0">
-                <a:sym typeface="Wingdings" panose="05000000000000000000" pitchFamily="2" charset="2"/>
-              </a:rPr>
-              <a:t> Image ändert sich immer!</a:t>
-            </a:r>
-          </a:p>
-          <a:p>
             <a:pPr lvl="1">
               <a:buFont typeface="Arial" panose="020B0604020202020204" pitchFamily="34" charset="0"/>
               <a:buChar char="•"/>
             </a:pPr>
             <a:r>
+              <a:rPr lang="de-DE" dirty="0" err="1">
+                <a:sym typeface="Wingdings" panose="05000000000000000000" pitchFamily="2" charset="2"/>
+              </a:rPr>
+              <a:t>Latest</a:t>
+            </a:r>
+            <a:r>
               <a:rPr lang="de-DE" dirty="0">
                 <a:sym typeface="Wingdings" panose="05000000000000000000" pitchFamily="2" charset="2"/>
               </a:rPr>
-              <a:t>Keine Version  z.B. </a:t>
+              <a:t> tag  z.B. </a:t>
             </a:r>
             <a:r>
               <a:rPr lang="de-DE" dirty="0" err="1">
                 <a:sym typeface="Wingdings" panose="05000000000000000000" pitchFamily="2" charset="2"/>
               </a:rPr>
-              <a:t>docker</a:t>
+              <a:t>docker:latest</a:t>
             </a:r>
             <a:endParaRPr lang="de-DE" dirty="0">
               <a:sym typeface="Wingdings" panose="05000000000000000000" pitchFamily="2" charset="2"/>
@@ -7527,28 +7615,22 @@
               <a:buChar char="•"/>
             </a:pPr>
             <a:r>
+              <a:rPr lang="de-DE" dirty="0" err="1">
+                <a:sym typeface="Wingdings" panose="05000000000000000000" pitchFamily="2" charset="2"/>
+              </a:rPr>
+              <a:t>Stable</a:t>
+            </a:r>
+            <a:r>
               <a:rPr lang="de-DE" dirty="0">
                 <a:sym typeface="Wingdings" panose="05000000000000000000" pitchFamily="2" charset="2"/>
               </a:rPr>
-              <a:t>Das </a:t>
+              <a:t> tag  z.B. </a:t>
             </a:r>
             <a:r>
               <a:rPr lang="de-DE" dirty="0" err="1">
                 <a:sym typeface="Wingdings" panose="05000000000000000000" pitchFamily="2" charset="2"/>
               </a:rPr>
-              <a:t>latest</a:t>
-            </a:r>
-            <a:r>
-              <a:rPr lang="de-DE" dirty="0">
-                <a:sym typeface="Wingdings" panose="05000000000000000000" pitchFamily="2" charset="2"/>
-              </a:rPr>
-              <a:t> tag  z.B. </a:t>
-            </a:r>
-            <a:r>
-              <a:rPr lang="de-DE" dirty="0" err="1">
-                <a:sym typeface="Wingdings" panose="05000000000000000000" pitchFamily="2" charset="2"/>
-              </a:rPr>
-              <a:t>docker:latest</a:t>
+              <a:t>docker:stable</a:t>
             </a:r>
             <a:endParaRPr lang="de-DE" dirty="0">
               <a:sym typeface="Wingdings" panose="05000000000000000000" pitchFamily="2" charset="2"/>
@@ -7563,31 +7645,46 @@
               <a:rPr lang="de-DE" dirty="0">
                 <a:sym typeface="Wingdings" panose="05000000000000000000" pitchFamily="2" charset="2"/>
               </a:rPr>
-              <a:t>Das </a:t>
-            </a:r>
-            <a:r>
-              <a:rPr lang="de-DE" dirty="0" err="1">
-                <a:sym typeface="Wingdings" panose="05000000000000000000" pitchFamily="2" charset="2"/>
-              </a:rPr>
-              <a:t>stable</a:t>
-            </a:r>
-            <a:r>
-              <a:rPr lang="de-DE" dirty="0">
-                <a:sym typeface="Wingdings" panose="05000000000000000000" pitchFamily="2" charset="2"/>
-              </a:rPr>
-              <a:t> tag  z.B. </a:t>
-            </a:r>
-            <a:r>
-              <a:rPr lang="de-DE" dirty="0" err="1">
-                <a:sym typeface="Wingdings" panose="05000000000000000000" pitchFamily="2" charset="2"/>
-              </a:rPr>
-              <a:t>docker:stable</a:t>
-            </a:r>
+              <a:t>Major Version  z.B. docker:26</a:t>
+            </a:r>
+          </a:p>
+          <a:p>
+            <a:pPr lvl="1">
+              <a:buFont typeface="Arial" panose="020B0604020202020204" pitchFamily="34" charset="0"/>
+              <a:buChar char="•"/>
+            </a:pPr>
             <a:endParaRPr lang="de-DE" dirty="0">
               <a:sym typeface="Wingdings" panose="05000000000000000000" pitchFamily="2" charset="2"/>
             </a:endParaRPr>
           </a:p>
           <a:p>
+            <a:pPr>
+              <a:buFont typeface="Arial" panose="020B0604020202020204" pitchFamily="34" charset="0"/>
+              <a:buChar char="•"/>
+            </a:pPr>
+            <a:r>
+              <a:rPr lang="de-DE" dirty="0" err="1">
+                <a:sym typeface="Wingdings" panose="05000000000000000000" pitchFamily="2" charset="2"/>
+              </a:rPr>
+              <a:t>Good</a:t>
+            </a:r>
+            <a:r>
+              <a:rPr lang="de-DE" dirty="0">
+                <a:sym typeface="Wingdings" panose="05000000000000000000" pitchFamily="2" charset="2"/>
+              </a:rPr>
+              <a:t> </a:t>
+            </a:r>
+            <a:r>
+              <a:rPr lang="de-DE" dirty="0" err="1">
+                <a:sym typeface="Wingdings" panose="05000000000000000000" pitchFamily="2" charset="2"/>
+              </a:rPr>
+              <a:t>practice</a:t>
+            </a:r>
+            <a:endParaRPr lang="de-DE" dirty="0">
+              <a:sym typeface="Wingdings" panose="05000000000000000000" pitchFamily="2" charset="2"/>
+            </a:endParaRPr>
+          </a:p>
+          <a:p>
             <a:pPr lvl="1">
               <a:buFont typeface="Arial" panose="020B0604020202020204" pitchFamily="34" charset="0"/>
               <a:buChar char="•"/>
@@ -7596,47 +7693,8 @@
               <a:rPr lang="de-DE" dirty="0">
                 <a:sym typeface="Wingdings" panose="05000000000000000000" pitchFamily="2" charset="2"/>
               </a:rPr>
-              <a:t>Major </a:t>
-            </a:r>
-            <a:r>
-              <a:rPr lang="de-DE" dirty="0" err="1">
-                <a:sym typeface="Wingdings" panose="05000000000000000000" pitchFamily="2" charset="2"/>
-              </a:rPr>
-              <a:t>version</a:t>
-            </a:r>
-            <a:r>
-              <a:rPr lang="de-DE" dirty="0">
-                <a:sym typeface="Wingdings" panose="05000000000000000000" pitchFamily="2" charset="2"/>
-              </a:rPr>
-              <a:t>  z.B. docker:26</a:t>
-            </a:r>
-          </a:p>
-          <a:p>
-            <a:pPr>
-              <a:buFont typeface="Arial" panose="020B0604020202020204" pitchFamily="34" charset="0"/>
-              <a:buChar char="•"/>
-            </a:pPr>
-            <a:r>
-              <a:rPr lang="de-DE" dirty="0" err="1">
-                <a:sym typeface="Wingdings" panose="05000000000000000000" pitchFamily="2" charset="2"/>
-              </a:rPr>
-              <a:t>Good</a:t>
-            </a:r>
-            <a:r>
-              <a:rPr lang="de-DE" dirty="0">
-                <a:sym typeface="Wingdings" panose="05000000000000000000" pitchFamily="2" charset="2"/>
-              </a:rPr>
-              <a:t> </a:t>
-            </a:r>
-            <a:r>
-              <a:rPr lang="de-DE" dirty="0" err="1">
-                <a:sym typeface="Wingdings" panose="05000000000000000000" pitchFamily="2" charset="2"/>
-              </a:rPr>
-              <a:t>practise</a:t>
-            </a:r>
-            <a:endParaRPr lang="de-DE" dirty="0">
-              <a:sym typeface="Wingdings" panose="05000000000000000000" pitchFamily="2" charset="2"/>
-            </a:endParaRPr>
+              <a:t>Spezifische Version  z.B. docker:26.1.3-dind</a:t>
+            </a:r>
           </a:p>
           <a:p>
             <a:pPr lvl="1">
@@ -7647,19 +7705,7 @@
               <a:rPr lang="de-DE" dirty="0">
                 <a:sym typeface="Wingdings" panose="05000000000000000000" pitchFamily="2" charset="2"/>
               </a:rPr>
-              <a:t>Spezifische Version  z.B. docker:26.1.3-dind</a:t>
-            </a:r>
-          </a:p>
-          <a:p>
-            <a:pPr lvl="1">
-              <a:buFont typeface="Arial" panose="020B0604020202020204" pitchFamily="34" charset="0"/>
-              <a:buChar char="•"/>
-            </a:pPr>
-            <a:r>
-              <a:rPr lang="de-DE" dirty="0">
-                <a:sym typeface="Wingdings" panose="05000000000000000000" pitchFamily="2" charset="2"/>
-              </a:rPr>
-              <a:t>--version nutzen  zuletzt funktionierende Version anzuzeigen</a:t>
+              <a:t>--version nutzen  zuletzt funktionierende Version anzeigen</a:t>
             </a:r>
             <a:endParaRPr lang="en-US" dirty="0"/>
           </a:p>
@@ -8301,7 +8347,7 @@
             </a:pPr>
             <a:r>
               <a:rPr lang="de-DE" u="sng" dirty="0"/>
-              <a:t>Tags eines bestimmten Container Image ansehen</a:t>
+              <a:t>Tags eines bestimmten Container Images ansehen</a:t>
             </a:r>
           </a:p>
           <a:p>
@@ -8476,7 +8522,7 @@
             </a:pPr>
             <a:r>
               <a:rPr lang="de-DE" b="1" dirty="0"/>
-              <a:t>Tags eines bestimmten Container Image ansehen</a:t>
+              <a:t>Tags eines bestimmten Container Images ansehen</a:t>
             </a:r>
           </a:p>
           <a:p>
@@ -8960,7 +9006,7 @@
             </a:pPr>
             <a:r>
               <a:rPr lang="de-DE" dirty="0"/>
-              <a:t>Tags eines bestimmten Container Image ansehen</a:t>
+              <a:t>Tags eines bestimmten Container Images ansehen</a:t>
             </a:r>
           </a:p>
           <a:p>
@@ -9270,7 +9316,7 @@
               <a:rPr lang="de-DE" dirty="0">
                 <a:sym typeface="Wingdings" panose="05000000000000000000" pitchFamily="2" charset="2"/>
               </a:rPr>
-              <a:t>“ mit dem kopierten Link ausführen</a:t>
+              <a:t>“ mit dem Link ausführen</a:t>
             </a:r>
           </a:p>
           <a:p>
@@ -9330,11 +9376,11 @@
               <a:rPr lang="nl-NL" dirty="0">
                 <a:latin typeface="Consolas" panose="020B0609020204030204" pitchFamily="49" charset="0"/>
               </a:rPr>
-              <a:t>docker ps –a </a:t>
+              <a:t>docker ps –a s</a:t>
             </a:r>
             <a:r>
               <a:rPr lang="nl-NL" dirty="0"/>
-              <a:t>Sollte nun einen weiteren Container anzeigen</a:t>
+              <a:t>ollte nun einen weiteren Container anzeigen</a:t>
             </a:r>
             <a:endParaRPr lang="de-DE" dirty="0">
               <a:latin typeface="Consolas" panose="020B0609020204030204" pitchFamily="49" charset="0"/>
@@ -9357,7 +9403,7 @@
           <p:nvPr/>
         </p:nvPicPr>
         <p:blipFill>
-          <a:blip r:embed="rId2"/>
+          <a:blip r:embed="rId3"/>
           <a:stretch>
             <a:fillRect/>
           </a:stretch>
@@ -9387,7 +9433,7 @@
           <p:nvPr/>
         </p:nvPicPr>
         <p:blipFill>
-          <a:blip r:embed="rId3">
+          <a:blip r:embed="rId4">
             <a:extLst>
               <a:ext uri="{28A0092B-C50C-407E-A947-70E740481C1C}">
                 <a14:useLocalDpi xmlns:a14="http://schemas.microsoft.com/office/drawing/2010/main" val="0"/>
@@ -9423,7 +9469,7 @@
           <p:nvPr/>
         </p:nvPicPr>
         <p:blipFill>
-          <a:blip r:embed="rId4">
+          <a:blip r:embed="rId5">
             <a:extLst>
               <a:ext uri="{28A0092B-C50C-407E-A947-70E740481C1C}">
                 <a14:useLocalDpi xmlns:a14="http://schemas.microsoft.com/office/drawing/2010/main" val="0"/>
@@ -9539,7 +9585,7 @@
             </a:pPr>
             <a:r>
               <a:rPr lang="de-DE" dirty="0"/>
-              <a:t>Tags eines bestimmten Container Image ansehen</a:t>
+              <a:t>Tags eines bestimmten Container Images ansehen</a:t>
             </a:r>
           </a:p>
           <a:p>
@@ -9688,9 +9734,48 @@
             </a:pPr>
             <a:r>
               <a:rPr lang="en-US" sz="2000" dirty="0">
+                <a:solidFill>
+                  <a:srgbClr val="FF0000"/>
+                </a:solidFill>
                 <a:latin typeface="Consolas" panose="020B0609020204030204" pitchFamily="49" charset="0"/>
               </a:rPr>
-              <a:t>&lt;registry server&gt;/&lt;namespace&gt;/&lt;project&gt;[/&lt;optional path&gt;]</a:t>
+              <a:t>&lt;registry server&gt;</a:t>
+            </a:r>
+            <a:r>
+              <a:rPr lang="en-US" sz="2000" dirty="0">
+                <a:latin typeface="Consolas" panose="020B0609020204030204" pitchFamily="49" charset="0"/>
+              </a:rPr>
+              <a:t>/</a:t>
+            </a:r>
+            <a:r>
+              <a:rPr lang="en-US" sz="2000" dirty="0">
+                <a:solidFill>
+                  <a:srgbClr val="002060"/>
+                </a:solidFill>
+                <a:latin typeface="Consolas" panose="020B0609020204030204" pitchFamily="49" charset="0"/>
+              </a:rPr>
+              <a:t>&lt;namespace&gt;</a:t>
+            </a:r>
+            <a:r>
+              <a:rPr lang="en-US" sz="2000" dirty="0">
+                <a:latin typeface="Consolas" panose="020B0609020204030204" pitchFamily="49" charset="0"/>
+              </a:rPr>
+              <a:t>/</a:t>
+            </a:r>
+            <a:r>
+              <a:rPr lang="en-US" sz="2000" dirty="0">
+                <a:solidFill>
+                  <a:srgbClr val="037C03"/>
+                </a:solidFill>
+                <a:latin typeface="Consolas" panose="020B0609020204030204" pitchFamily="49" charset="0"/>
+              </a:rPr>
+              <a:t>&lt;project&gt;</a:t>
+            </a:r>
+            <a:r>
+              <a:rPr lang="en-US" sz="2000" dirty="0">
+                <a:latin typeface="Consolas" panose="020B0609020204030204" pitchFamily="49" charset="0"/>
+              </a:rPr>
+              <a:t>[/&lt;optional path&gt;]</a:t>
             </a:r>
           </a:p>
           <a:p>
@@ -9698,6 +9783,16 @@
               <a:buFont typeface="Arial" panose="020B0604020202020204" pitchFamily="34" charset="0"/>
               <a:buChar char="•"/>
             </a:pPr>
+            <a:r>
+              <a:rPr lang="de-DE" b="0" i="0" dirty="0">
+                <a:solidFill>
+                  <a:srgbClr val="FF0000"/>
+                </a:solidFill>
+                <a:effectLst/>
+                <a:latin typeface="GitLab Mono"/>
+              </a:rPr>
+              <a:t>gitlab.example.com</a:t>
+            </a:r>
             <a:r>
               <a:rPr lang="de-DE" b="0" i="0" dirty="0">
                 <a:solidFill>
@@ -9706,12 +9801,12 @@
                 <a:effectLst/>
                 <a:latin typeface="GitLab Mono"/>
               </a:rPr>
-              <a:t>gitlab.example.com/</a:t>
+              <a:t>/</a:t>
             </a:r>
             <a:r>
               <a:rPr lang="de-DE" b="0" i="0" dirty="0" err="1">
                 <a:solidFill>
-                  <a:srgbClr val="404040"/>
+                  <a:srgbClr val="002060"/>
                 </a:solidFill>
                 <a:effectLst/>
                 <a:latin typeface="GitLab Mono"/>
@@ -9731,7 +9826,7 @@
             <a:r>
               <a:rPr lang="de-DE" b="0" i="0" dirty="0" err="1">
                 <a:solidFill>
-                  <a:srgbClr val="404040"/>
+                  <a:srgbClr val="037C03"/>
                 </a:solidFill>
                 <a:effectLst/>
                 <a:latin typeface="GitLab Mono"/>
@@ -9739,6 +9834,9 @@
               <a:t>myproject</a:t>
             </a:r>
             <a:endParaRPr lang="en-US" dirty="0">
+              <a:solidFill>
+                <a:srgbClr val="037C03"/>
+              </a:solidFill>
               <a:latin typeface="Consolas" panose="020B0609020204030204" pitchFamily="49" charset="0"/>
             </a:endParaRPr>
           </a:p>
@@ -9758,17 +9856,12 @@
             </a:pPr>
             <a:r>
               <a:rPr lang="en-US" dirty="0"/>
-              <a:t>Project</a:t>
-            </a:r>
-            <a:r>
-              <a:rPr lang="en-US"/>
-              <a:t>: </a:t>
-            </a:r>
-            <a:r>
-              <a:rPr lang="nl-NL"/>
+              <a:t>Project: </a:t>
+            </a:r>
+            <a:r>
+              <a:rPr lang="nl-NL" dirty="0"/>
               <a:t>gitlab</a:t>
             </a:r>
-            <a:endParaRPr lang="nl-NL" dirty="0"/>
           </a:p>
           <a:p>
             <a:pPr>
@@ -9795,7 +9888,7 @@
               <a:rPr lang="nl-NL" dirty="0">
                 <a:sym typeface="Wingdings" panose="05000000000000000000" pitchFamily="2" charset="2"/>
               </a:rPr>
-              <a:t>Zusätzliche Namen ans Ende des Images sind erlaubt</a:t>
+              <a:t>Zusätzliche Pfade am Ende eines Images erlaubt</a:t>
             </a:r>
           </a:p>
           <a:p>
@@ -9809,6 +9902,15 @@
               </a:rPr>
               <a:t>Aber: nur bis zu zwei Ebenen tief!</a:t>
             </a:r>
+          </a:p>
+          <a:p>
+            <a:pPr lvl="1">
+              <a:buFont typeface="Arial" panose="020B0604020202020204" pitchFamily="34" charset="0"/>
+              <a:buChar char="•"/>
+            </a:pPr>
+            <a:endParaRPr lang="nl-NL" sz="1800" dirty="0">
+              <a:sym typeface="Wingdings" panose="05000000000000000000" pitchFamily="2" charset="2"/>
+            </a:endParaRPr>
           </a:p>
           <a:p>
             <a:pPr>
@@ -9963,7 +10065,7 @@
             </a:pPr>
             <a:r>
               <a:rPr lang="de-DE" dirty="0"/>
-              <a:t>Tags eines bestimmten Container Image ansehen</a:t>
+              <a:t>Tags eines bestimmten Container Images ansehen</a:t>
             </a:r>
           </a:p>
           <a:p>
@@ -10120,7 +10222,7 @@
             </a:r>
             <a:r>
               <a:rPr lang="de-DE" dirty="0"/>
-              <a:t> zugehörigen Projekt</a:t>
+              <a:t> zugehörigem Projekt</a:t>
             </a:r>
           </a:p>
           <a:p>
@@ -10132,13 +10234,7 @@
               <a:rPr lang="de-DE" dirty="0">
                 <a:sym typeface="Wingdings" panose="05000000000000000000" pitchFamily="2" charset="2"/>
               </a:rPr>
-              <a:t> Projekt verschieben oder </a:t>
-            </a:r>
-            <a:r>
-              <a:rPr lang="de-DE" dirty="0" err="1">
-                <a:sym typeface="Wingdings" panose="05000000000000000000" pitchFamily="2" charset="2"/>
-              </a:rPr>
-              <a:t>umbennen</a:t>
+              <a:t> Projekt verschieben oder umbenennen</a:t>
             </a:r>
             <a:endParaRPr lang="de-DE" dirty="0"/>
           </a:p>
@@ -10149,7 +10245,7 @@
             </a:pPr>
             <a:r>
               <a:rPr lang="de-DE" dirty="0"/>
-              <a:t>GitLab.com gehosteten Instanzen unterstützt</a:t>
+              <a:t>Von GitLab.com gehosteten Instanzen unterstützt</a:t>
             </a:r>
           </a:p>
           <a:p>
@@ -10736,7 +10832,7 @@
             </a:pPr>
             <a:r>
               <a:rPr lang="de-DE" dirty="0"/>
-              <a:t>Tags eines bestimmten Container Image ansehen</a:t>
+              <a:t>Tags eines bestimmten Container Images ansehen</a:t>
             </a:r>
           </a:p>
           <a:p>
@@ -11397,7 +11493,7 @@
             </a:pPr>
             <a:r>
               <a:rPr lang="de-DE" dirty="0"/>
-              <a:t>Default: Für jeden Sichtbar mit Zugriff aufs Projekt</a:t>
+              <a:t>Default: Für jeden sichtbar mit Zugriff aufs Projekt</a:t>
             </a:r>
           </a:p>
           <a:p>
@@ -11538,7 +11634,7 @@
             </a:pPr>
             <a:r>
               <a:rPr lang="de-DE" sz="1800" dirty="0"/>
-              <a:t>Container Registry hat das Sichtbarkeitslevel des Projekts!</a:t>
+              <a:t>Container Registry hat das Sichtbarkeitslevel des Projektes!</a:t>
             </a:r>
           </a:p>
           <a:p>
@@ -11754,7 +11850,7 @@
             </a:pPr>
             <a:r>
               <a:rPr lang="de-DE" dirty="0"/>
-              <a:t>Docker V2</a:t>
+              <a:t>Docker v2</a:t>
             </a:r>
           </a:p>
           <a:p>
@@ -11774,7 +11870,7 @@
             </a:pPr>
             <a:r>
               <a:rPr lang="de-DE" dirty="0"/>
-              <a:t>Container Registry entspricht OCI-</a:t>
+              <a:t>Container Registry entspricht OCI </a:t>
             </a:r>
             <a:r>
               <a:rPr lang="de-DE" dirty="0" err="1"/>
@@ -12651,7 +12747,7 @@
               <a:rPr lang="de-DE" sz="1200" dirty="0">
                 <a:latin typeface="Arial" charset="0"/>
               </a:rPr>
-              <a:t>Statisch, Persistiert Container Image</a:t>
+              <a:t>Statisch, persistiert Container Image</a:t>
             </a:r>
           </a:p>
         </p:txBody>
@@ -13775,7 +13871,7 @@
               <a:rPr lang="de-DE" sz="1200" dirty="0">
                 <a:latin typeface="Arial" charset="0"/>
               </a:rPr>
-              <a:t>Statisch, Persistiert Container Image</a:t>
+              <a:t>Statisch, persistiert Container Image</a:t>
             </a:r>
           </a:p>
         </p:txBody>
@@ -14431,7 +14527,7 @@
             </a:pPr>
             <a:r>
               <a:rPr lang="de-DE" dirty="0" err="1"/>
-              <a:t>Dockerhub</a:t>
+              <a:t>DockerHub</a:t>
             </a:r>
             <a:endParaRPr lang="de-DE" dirty="0"/>
           </a:p>
@@ -14442,7 +14538,7 @@
             </a:pPr>
             <a:r>
               <a:rPr lang="de-DE" dirty="0"/>
-              <a:t>öffentliche Registry</a:t>
+              <a:t>Bekannteste, öffentliche Registry</a:t>
             </a:r>
           </a:p>
           <a:p>
@@ -14484,7 +14580,7 @@
             </a:pPr>
             <a:r>
               <a:rPr lang="de-DE" dirty="0"/>
-              <a:t>Speichert Docker-Anwendungen</a:t>
+              <a:t>Speichert Docker Images</a:t>
             </a:r>
           </a:p>
           <a:p>
@@ -14494,7 +14590,7 @@
             </a:pPr>
             <a:r>
               <a:rPr lang="de-DE" dirty="0"/>
-              <a:t>Eigenes Docker Image innerhalb </a:t>
+              <a:t>Verwendung eigener Docker Images für </a:t>
             </a:r>
             <a:r>
               <a:rPr lang="de-DE" dirty="0" err="1"/>
@@ -14502,7 +14598,7 @@
             </a:r>
             <a:r>
               <a:rPr lang="de-DE" dirty="0"/>
-              <a:t> CI Pipeline verwenden</a:t>
+              <a:t> CI Pipeline möglich</a:t>
             </a:r>
           </a:p>
           <a:p>
@@ -14565,11 +14661,19 @@
             </a:pPr>
             <a:r>
               <a:rPr lang="de-DE" dirty="0"/>
-              <a:t>Falls Images von Docker Hub</a:t>
-            </a:r>
-          </a:p>
-          <a:p>
-            <a:pPr lvl="2">
+              <a:t>Caching von </a:t>
+            </a:r>
+            <a:r>
+              <a:rPr lang="de-DE" dirty="0" err="1"/>
+              <a:t>DockerHub</a:t>
+            </a:r>
+            <a:r>
+              <a:rPr lang="de-DE" dirty="0"/>
+              <a:t> Images</a:t>
+            </a:r>
+          </a:p>
+          <a:p>
+            <a:pPr lvl="1">
               <a:buFont typeface="Arial" panose="020B0604020202020204" pitchFamily="34" charset="0"/>
               <a:buChar char="•"/>
             </a:pPr>
@@ -14583,13 +14687,8 @@
             </a:r>
             <a:r>
               <a:rPr lang="de-DE" sz="1800" dirty="0"/>
-              <a:t>“ und </a:t>
-            </a:r>
-            <a:r>
-              <a:rPr lang="de-DE" sz="1800"/>
-              <a:t>beschleunigt Pipelines</a:t>
-            </a:r>
-            <a:endParaRPr lang="de-DE" sz="1800" dirty="0"/>
+              <a:t>“ und beschleunigt Pipelines</a:t>
+            </a:r>
           </a:p>
           <a:p>
             <a:pPr>

</xml_diff>